<commit_message>
publication, research, software, teaching major modification
</commit_message>
<xml_diff>
--- a/files/figures/Figures_on_website.pptx
+++ b/files/figures/Figures_on_website.pptx
@@ -10,6 +10,7 @@
     <p:sldId id="259" r:id="rId4"/>
     <p:sldId id="257" r:id="rId5"/>
     <p:sldId id="260" r:id="rId6"/>
+    <p:sldId id="261" r:id="rId7"/>
   </p:sldIdLst>
   <p:sldSz cx="11887200" cy="6858000"/>
   <p:notesSz cx="6858000" cy="9144000"/>
@@ -247,7 +248,7 @@
           <a:p>
             <a:fld id="{F530D73F-E4EB-4C49-A074-FBF89DACC274}" type="datetimeFigureOut">
               <a:rPr lang="en-US" smtClean="0"/>
-              <a:t>9/28/18</a:t>
+              <a:t>9/29/18</a:t>
             </a:fld>
             <a:endParaRPr lang="en-US"/>
           </a:p>
@@ -417,7 +418,7 @@
           <a:p>
             <a:fld id="{F530D73F-E4EB-4C49-A074-FBF89DACC274}" type="datetimeFigureOut">
               <a:rPr lang="en-US" smtClean="0"/>
-              <a:t>9/28/18</a:t>
+              <a:t>9/29/18</a:t>
             </a:fld>
             <a:endParaRPr lang="en-US"/>
           </a:p>
@@ -597,7 +598,7 @@
           <a:p>
             <a:fld id="{F530D73F-E4EB-4C49-A074-FBF89DACC274}" type="datetimeFigureOut">
               <a:rPr lang="en-US" smtClean="0"/>
-              <a:t>9/28/18</a:t>
+              <a:t>9/29/18</a:t>
             </a:fld>
             <a:endParaRPr lang="en-US"/>
           </a:p>
@@ -767,7 +768,7 @@
           <a:p>
             <a:fld id="{F530D73F-E4EB-4C49-A074-FBF89DACC274}" type="datetimeFigureOut">
               <a:rPr lang="en-US" smtClean="0"/>
-              <a:t>9/28/18</a:t>
+              <a:t>9/29/18</a:t>
             </a:fld>
             <a:endParaRPr lang="en-US"/>
           </a:p>
@@ -1013,7 +1014,7 @@
           <a:p>
             <a:fld id="{F530D73F-E4EB-4C49-A074-FBF89DACC274}" type="datetimeFigureOut">
               <a:rPr lang="en-US" smtClean="0"/>
-              <a:t>9/28/18</a:t>
+              <a:t>9/29/18</a:t>
             </a:fld>
             <a:endParaRPr lang="en-US"/>
           </a:p>
@@ -1245,7 +1246,7 @@
           <a:p>
             <a:fld id="{F530D73F-E4EB-4C49-A074-FBF89DACC274}" type="datetimeFigureOut">
               <a:rPr lang="en-US" smtClean="0"/>
-              <a:t>9/28/18</a:t>
+              <a:t>9/29/18</a:t>
             </a:fld>
             <a:endParaRPr lang="en-US"/>
           </a:p>
@@ -1612,7 +1613,7 @@
           <a:p>
             <a:fld id="{F530D73F-E4EB-4C49-A074-FBF89DACC274}" type="datetimeFigureOut">
               <a:rPr lang="en-US" smtClean="0"/>
-              <a:t>9/28/18</a:t>
+              <a:t>9/29/18</a:t>
             </a:fld>
             <a:endParaRPr lang="en-US"/>
           </a:p>
@@ -1730,7 +1731,7 @@
           <a:p>
             <a:fld id="{F530D73F-E4EB-4C49-A074-FBF89DACC274}" type="datetimeFigureOut">
               <a:rPr lang="en-US" smtClean="0"/>
-              <a:t>9/28/18</a:t>
+              <a:t>9/29/18</a:t>
             </a:fld>
             <a:endParaRPr lang="en-US"/>
           </a:p>
@@ -1825,7 +1826,7 @@
           <a:p>
             <a:fld id="{F530D73F-E4EB-4C49-A074-FBF89DACC274}" type="datetimeFigureOut">
               <a:rPr lang="en-US" smtClean="0"/>
-              <a:t>9/28/18</a:t>
+              <a:t>9/29/18</a:t>
             </a:fld>
             <a:endParaRPr lang="en-US"/>
           </a:p>
@@ -2102,7 +2103,7 @@
           <a:p>
             <a:fld id="{F530D73F-E4EB-4C49-A074-FBF89DACC274}" type="datetimeFigureOut">
               <a:rPr lang="en-US" smtClean="0"/>
-              <a:t>9/28/18</a:t>
+              <a:t>9/29/18</a:t>
             </a:fld>
             <a:endParaRPr lang="en-US"/>
           </a:p>
@@ -2359,7 +2360,7 @@
           <a:p>
             <a:fld id="{F530D73F-E4EB-4C49-A074-FBF89DACC274}" type="datetimeFigureOut">
               <a:rPr lang="en-US" smtClean="0"/>
-              <a:t>9/28/18</a:t>
+              <a:t>9/29/18</a:t>
             </a:fld>
             <a:endParaRPr lang="en-US"/>
           </a:p>
@@ -2572,7 +2573,7 @@
           <a:p>
             <a:fld id="{F530D73F-E4EB-4C49-A074-FBF89DACC274}" type="datetimeFigureOut">
               <a:rPr lang="en-US" smtClean="0"/>
-              <a:t>9/28/18</a:t>
+              <a:t>9/29/18</a:t>
             </a:fld>
             <a:endParaRPr lang="en-US"/>
           </a:p>
@@ -5424,6 +5425,1295 @@
 </p:sld>
 </file>
 
+<file path=ppt/slides/slide6.xml><?xml version="1.0" encoding="utf-8"?>
+<p:sld xmlns:a="http://schemas.openxmlformats.org/drawingml/2006/main" xmlns:r="http://schemas.openxmlformats.org/officeDocument/2006/relationships" xmlns:p="http://schemas.openxmlformats.org/presentationml/2006/main">
+  <p:cSld>
+    <p:spTree>
+      <p:nvGrpSpPr>
+        <p:cNvPr id="1" name=""/>
+        <p:cNvGrpSpPr/>
+        <p:nvPr/>
+      </p:nvGrpSpPr>
+      <p:grpSpPr>
+        <a:xfrm>
+          <a:off x="0" y="0"/>
+          <a:ext cx="0" cy="0"/>
+          <a:chOff x="0" y="0"/>
+          <a:chExt cx="0" cy="0"/>
+        </a:xfrm>
+      </p:grpSpPr>
+      <p:pic>
+        <p:nvPicPr>
+          <p:cNvPr id="4" name="Picture 2">
+            <a:extLst>
+              <a:ext uri="{FF2B5EF4-FFF2-40B4-BE49-F238E27FC236}">
+                <a16:creationId xmlns:a16="http://schemas.microsoft.com/office/drawing/2014/main" id="{01CC9699-3952-9741-B962-8C35A15FAAF4}"/>
+              </a:ext>
+            </a:extLst>
+          </p:cNvPr>
+          <p:cNvPicPr>
+            <a:picLocks noChangeAspect="1" noChangeArrowheads="1"/>
+          </p:cNvPicPr>
+          <p:nvPr/>
+        </p:nvPicPr>
+        <p:blipFill>
+          <a:blip r:embed="rId2" cstate="print"/>
+          <a:srcRect/>
+          <a:stretch>
+            <a:fillRect/>
+          </a:stretch>
+        </p:blipFill>
+        <p:spPr bwMode="auto">
+          <a:xfrm>
+            <a:off x="1504122" y="381000"/>
+            <a:ext cx="8458200" cy="3581400"/>
+          </a:xfrm>
+          <a:prstGeom prst="rect">
+            <a:avLst/>
+          </a:prstGeom>
+          <a:noFill/>
+          <a:ln w="9525">
+            <a:noFill/>
+            <a:miter lim="800000"/>
+            <a:headEnd/>
+            <a:tailEnd/>
+          </a:ln>
+        </p:spPr>
+      </p:pic>
+      <p:sp>
+        <p:nvSpPr>
+          <p:cNvPr id="5" name="TextBox 4">
+            <a:extLst>
+              <a:ext uri="{FF2B5EF4-FFF2-40B4-BE49-F238E27FC236}">
+                <a16:creationId xmlns:a16="http://schemas.microsoft.com/office/drawing/2014/main" id="{29606B2C-D037-0847-9639-367C3CD7C253}"/>
+              </a:ext>
+            </a:extLst>
+          </p:cNvPr>
+          <p:cNvSpPr txBox="1"/>
+          <p:nvPr/>
+        </p:nvSpPr>
+        <p:spPr>
+          <a:xfrm>
+            <a:off x="2298297" y="4419600"/>
+            <a:ext cx="439544" cy="369332"/>
+          </a:xfrm>
+          <a:prstGeom prst="rect">
+            <a:avLst/>
+          </a:prstGeom>
+          <a:noFill/>
+        </p:spPr>
+        <p:txBody>
+          <a:bodyPr wrap="none" rtlCol="0">
+            <a:spAutoFit/>
+          </a:bodyPr>
+          <a:lstStyle/>
+          <a:p>
+            <a:r>
+              <a:rPr lang="en-US" dirty="0"/>
+              <a:t>D</a:t>
+            </a:r>
+            <a:r>
+              <a:rPr lang="en-US" baseline="-25000" dirty="0"/>
+              <a:t>1</a:t>
+            </a:r>
+          </a:p>
+        </p:txBody>
+      </p:sp>
+      <p:sp>
+        <p:nvSpPr>
+          <p:cNvPr id="6" name="Rectangle 5">
+            <a:extLst>
+              <a:ext uri="{FF2B5EF4-FFF2-40B4-BE49-F238E27FC236}">
+                <a16:creationId xmlns:a16="http://schemas.microsoft.com/office/drawing/2014/main" id="{0D0C79F6-00C2-8A4F-B868-7B8D575754D0}"/>
+              </a:ext>
+            </a:extLst>
+          </p:cNvPr>
+          <p:cNvSpPr/>
+          <p:nvPr/>
+        </p:nvSpPr>
+        <p:spPr>
+          <a:xfrm>
+            <a:off x="2145898" y="4048780"/>
+            <a:ext cx="838200" cy="1230868"/>
+          </a:xfrm>
+          <a:prstGeom prst="rect">
+            <a:avLst/>
+          </a:prstGeom>
+          <a:noFill/>
+        </p:spPr>
+        <p:style>
+          <a:lnRef idx="2">
+            <a:schemeClr val="accent1">
+              <a:shade val="50000"/>
+            </a:schemeClr>
+          </a:lnRef>
+          <a:fillRef idx="1">
+            <a:schemeClr val="accent1"/>
+          </a:fillRef>
+          <a:effectRef idx="0">
+            <a:schemeClr val="accent1"/>
+          </a:effectRef>
+          <a:fontRef idx="minor">
+            <a:schemeClr val="lt1"/>
+          </a:fontRef>
+        </p:style>
+        <p:txBody>
+          <a:bodyPr rtlCol="0" anchor="ctr"/>
+          <a:lstStyle/>
+          <a:p>
+            <a:pPr algn="ctr"/>
+            <a:endParaRPr lang="en-US"/>
+          </a:p>
+        </p:txBody>
+      </p:sp>
+      <p:sp>
+        <p:nvSpPr>
+          <p:cNvPr id="7" name="TextBox 6">
+            <a:extLst>
+              <a:ext uri="{FF2B5EF4-FFF2-40B4-BE49-F238E27FC236}">
+                <a16:creationId xmlns:a16="http://schemas.microsoft.com/office/drawing/2014/main" id="{B29C8F55-5F11-C54E-B2F4-5B1919702D58}"/>
+              </a:ext>
+            </a:extLst>
+          </p:cNvPr>
+          <p:cNvSpPr txBox="1"/>
+          <p:nvPr/>
+        </p:nvSpPr>
+        <p:spPr>
+          <a:xfrm>
+            <a:off x="3409833" y="4441448"/>
+            <a:ext cx="439544" cy="369332"/>
+          </a:xfrm>
+          <a:prstGeom prst="rect">
+            <a:avLst/>
+          </a:prstGeom>
+          <a:noFill/>
+        </p:spPr>
+        <p:txBody>
+          <a:bodyPr wrap="none" rtlCol="0">
+            <a:spAutoFit/>
+          </a:bodyPr>
+          <a:lstStyle/>
+          <a:p>
+            <a:r>
+              <a:rPr lang="en-US" dirty="0"/>
+              <a:t>D</a:t>
+            </a:r>
+            <a:r>
+              <a:rPr lang="en-US" baseline="-25000" dirty="0"/>
+              <a:t>2</a:t>
+            </a:r>
+          </a:p>
+        </p:txBody>
+      </p:sp>
+      <p:sp>
+        <p:nvSpPr>
+          <p:cNvPr id="8" name="Rectangle 7">
+            <a:extLst>
+              <a:ext uri="{FF2B5EF4-FFF2-40B4-BE49-F238E27FC236}">
+                <a16:creationId xmlns:a16="http://schemas.microsoft.com/office/drawing/2014/main" id="{0D04F5C0-0ADD-3D43-8ADB-19ED3C4A4359}"/>
+              </a:ext>
+            </a:extLst>
+          </p:cNvPr>
+          <p:cNvSpPr/>
+          <p:nvPr/>
+        </p:nvSpPr>
+        <p:spPr>
+          <a:xfrm>
+            <a:off x="3257434" y="4048780"/>
+            <a:ext cx="838200" cy="1230868"/>
+          </a:xfrm>
+          <a:prstGeom prst="rect">
+            <a:avLst/>
+          </a:prstGeom>
+          <a:noFill/>
+        </p:spPr>
+        <p:style>
+          <a:lnRef idx="2">
+            <a:schemeClr val="accent1">
+              <a:shade val="50000"/>
+            </a:schemeClr>
+          </a:lnRef>
+          <a:fillRef idx="1">
+            <a:schemeClr val="accent1"/>
+          </a:fillRef>
+          <a:effectRef idx="0">
+            <a:schemeClr val="accent1"/>
+          </a:effectRef>
+          <a:fontRef idx="minor">
+            <a:schemeClr val="lt1"/>
+          </a:fontRef>
+        </p:style>
+        <p:txBody>
+          <a:bodyPr rtlCol="0" anchor="ctr"/>
+          <a:lstStyle/>
+          <a:p>
+            <a:pPr algn="ctr"/>
+            <a:endParaRPr lang="en-US"/>
+          </a:p>
+        </p:txBody>
+      </p:sp>
+      <p:sp>
+        <p:nvSpPr>
+          <p:cNvPr id="9" name="TextBox 8">
+            <a:extLst>
+              <a:ext uri="{FF2B5EF4-FFF2-40B4-BE49-F238E27FC236}">
+                <a16:creationId xmlns:a16="http://schemas.microsoft.com/office/drawing/2014/main" id="{1C46F157-523C-824B-980C-92ADCA1D2640}"/>
+              </a:ext>
+            </a:extLst>
+          </p:cNvPr>
+          <p:cNvSpPr txBox="1"/>
+          <p:nvPr/>
+        </p:nvSpPr>
+        <p:spPr>
+          <a:xfrm>
+            <a:off x="1961322" y="5267405"/>
+            <a:ext cx="1066318" cy="523220"/>
+          </a:xfrm>
+          <a:prstGeom prst="rect">
+            <a:avLst/>
+          </a:prstGeom>
+          <a:noFill/>
+        </p:spPr>
+        <p:txBody>
+          <a:bodyPr wrap="none" rtlCol="0">
+            <a:spAutoFit/>
+          </a:bodyPr>
+          <a:lstStyle/>
+          <a:p>
+            <a:pPr algn="ctr"/>
+            <a:r>
+              <a:rPr lang="en-US" sz="1400" b="1" dirty="0"/>
+              <a:t>G genes</a:t>
+            </a:r>
+            <a:r>
+              <a:rPr lang="en-US" sz="1400" b="1" dirty="0">
+                <a:sym typeface="Symbol"/>
+              </a:rPr>
+              <a:t></a:t>
+            </a:r>
+          </a:p>
+          <a:p>
+            <a:pPr algn="ctr"/>
+            <a:r>
+              <a:rPr lang="en-US" sz="1400" b="1" dirty="0"/>
+              <a:t>S</a:t>
+            </a:r>
+            <a:r>
+              <a:rPr lang="en-US" sz="1400" b="1" baseline="-25000" dirty="0"/>
+              <a:t>1</a:t>
+            </a:r>
+            <a:r>
+              <a:rPr lang="en-US" sz="1400" b="1" dirty="0"/>
+              <a:t> samples</a:t>
+            </a:r>
+            <a:endParaRPr lang="en-US" sz="1400" b="1" baseline="-25000" dirty="0"/>
+          </a:p>
+        </p:txBody>
+      </p:sp>
+      <p:sp>
+        <p:nvSpPr>
+          <p:cNvPr id="10" name="TextBox 9">
+            <a:extLst>
+              <a:ext uri="{FF2B5EF4-FFF2-40B4-BE49-F238E27FC236}">
+                <a16:creationId xmlns:a16="http://schemas.microsoft.com/office/drawing/2014/main" id="{56624B6D-AF17-3841-ADA5-373665B2A868}"/>
+              </a:ext>
+            </a:extLst>
+          </p:cNvPr>
+          <p:cNvSpPr txBox="1"/>
+          <p:nvPr/>
+        </p:nvSpPr>
+        <p:spPr>
+          <a:xfrm>
+            <a:off x="3149059" y="5267980"/>
+            <a:ext cx="1066318" cy="523220"/>
+          </a:xfrm>
+          <a:prstGeom prst="rect">
+            <a:avLst/>
+          </a:prstGeom>
+          <a:noFill/>
+        </p:spPr>
+        <p:txBody>
+          <a:bodyPr wrap="none" rtlCol="0">
+            <a:spAutoFit/>
+          </a:bodyPr>
+          <a:lstStyle/>
+          <a:p>
+            <a:pPr algn="ctr"/>
+            <a:r>
+              <a:rPr lang="en-US" sz="1400" b="1" dirty="0"/>
+              <a:t>G genes</a:t>
+            </a:r>
+            <a:r>
+              <a:rPr lang="en-US" sz="1400" b="1" dirty="0">
+                <a:sym typeface="Symbol"/>
+              </a:rPr>
+              <a:t></a:t>
+            </a:r>
+          </a:p>
+          <a:p>
+            <a:pPr algn="ctr"/>
+            <a:r>
+              <a:rPr lang="en-US" sz="1400" b="1" dirty="0"/>
+              <a:t>S</a:t>
+            </a:r>
+            <a:r>
+              <a:rPr lang="en-US" sz="1400" b="1" baseline="-25000" dirty="0"/>
+              <a:t>2</a:t>
+            </a:r>
+            <a:r>
+              <a:rPr lang="en-US" sz="1400" b="1" dirty="0"/>
+              <a:t> samples</a:t>
+            </a:r>
+            <a:endParaRPr lang="en-US" sz="1400" b="1" baseline="-25000" dirty="0"/>
+          </a:p>
+        </p:txBody>
+      </p:sp>
+      <p:sp>
+        <p:nvSpPr>
+          <p:cNvPr id="11" name="TextBox 10">
+            <a:extLst>
+              <a:ext uri="{FF2B5EF4-FFF2-40B4-BE49-F238E27FC236}">
+                <a16:creationId xmlns:a16="http://schemas.microsoft.com/office/drawing/2014/main" id="{1C9A1469-EC8E-2040-B8F1-3DCF6AFF3063}"/>
+              </a:ext>
+            </a:extLst>
+          </p:cNvPr>
+          <p:cNvSpPr txBox="1"/>
+          <p:nvPr/>
+        </p:nvSpPr>
+        <p:spPr>
+          <a:xfrm>
+            <a:off x="5061591" y="4441448"/>
+            <a:ext cx="474810" cy="369332"/>
+          </a:xfrm>
+          <a:prstGeom prst="rect">
+            <a:avLst/>
+          </a:prstGeom>
+          <a:noFill/>
+        </p:spPr>
+        <p:txBody>
+          <a:bodyPr wrap="none" rtlCol="0">
+            <a:spAutoFit/>
+          </a:bodyPr>
+          <a:lstStyle/>
+          <a:p>
+            <a:r>
+              <a:rPr lang="en-US" dirty="0"/>
+              <a:t>D</a:t>
+            </a:r>
+            <a:r>
+              <a:rPr lang="en-US" baseline="-25000" dirty="0"/>
+              <a:t>K</a:t>
+            </a:r>
+          </a:p>
+        </p:txBody>
+      </p:sp>
+      <p:sp>
+        <p:nvSpPr>
+          <p:cNvPr id="12" name="Rectangle 11">
+            <a:extLst>
+              <a:ext uri="{FF2B5EF4-FFF2-40B4-BE49-F238E27FC236}">
+                <a16:creationId xmlns:a16="http://schemas.microsoft.com/office/drawing/2014/main" id="{D86B51AC-34F8-C04A-8755-BA13AB8EDC31}"/>
+              </a:ext>
+            </a:extLst>
+          </p:cNvPr>
+          <p:cNvSpPr/>
+          <p:nvPr/>
+        </p:nvSpPr>
+        <p:spPr>
+          <a:xfrm>
+            <a:off x="4909192" y="4048780"/>
+            <a:ext cx="838200" cy="1230868"/>
+          </a:xfrm>
+          <a:prstGeom prst="rect">
+            <a:avLst/>
+          </a:prstGeom>
+          <a:noFill/>
+        </p:spPr>
+        <p:style>
+          <a:lnRef idx="2">
+            <a:schemeClr val="accent1">
+              <a:shade val="50000"/>
+            </a:schemeClr>
+          </a:lnRef>
+          <a:fillRef idx="1">
+            <a:schemeClr val="accent1"/>
+          </a:fillRef>
+          <a:effectRef idx="0">
+            <a:schemeClr val="accent1"/>
+          </a:effectRef>
+          <a:fontRef idx="minor">
+            <a:schemeClr val="lt1"/>
+          </a:fontRef>
+        </p:style>
+        <p:txBody>
+          <a:bodyPr rtlCol="0" anchor="ctr"/>
+          <a:lstStyle/>
+          <a:p>
+            <a:pPr algn="ctr"/>
+            <a:endParaRPr lang="en-US"/>
+          </a:p>
+        </p:txBody>
+      </p:sp>
+      <p:sp>
+        <p:nvSpPr>
+          <p:cNvPr id="13" name="TextBox 12">
+            <a:extLst>
+              <a:ext uri="{FF2B5EF4-FFF2-40B4-BE49-F238E27FC236}">
+                <a16:creationId xmlns:a16="http://schemas.microsoft.com/office/drawing/2014/main" id="{C81D7C6A-2EAF-A04B-AF49-91BA4E081E86}"/>
+              </a:ext>
+            </a:extLst>
+          </p:cNvPr>
+          <p:cNvSpPr txBox="1"/>
+          <p:nvPr/>
+        </p:nvSpPr>
+        <p:spPr>
+          <a:xfrm>
+            <a:off x="4784787" y="5267980"/>
+            <a:ext cx="1098378" cy="523220"/>
+          </a:xfrm>
+          <a:prstGeom prst="rect">
+            <a:avLst/>
+          </a:prstGeom>
+          <a:noFill/>
+        </p:spPr>
+        <p:txBody>
+          <a:bodyPr wrap="none" rtlCol="0">
+            <a:spAutoFit/>
+          </a:bodyPr>
+          <a:lstStyle/>
+          <a:p>
+            <a:pPr algn="ctr"/>
+            <a:r>
+              <a:rPr lang="en-US" sz="1400" b="1" dirty="0"/>
+              <a:t>G genes</a:t>
+            </a:r>
+            <a:r>
+              <a:rPr lang="en-US" sz="1400" b="1" dirty="0">
+                <a:sym typeface="Symbol"/>
+              </a:rPr>
+              <a:t></a:t>
+            </a:r>
+          </a:p>
+          <a:p>
+            <a:pPr algn="ctr"/>
+            <a:r>
+              <a:rPr lang="en-US" sz="1400" b="1" dirty="0"/>
+              <a:t>S</a:t>
+            </a:r>
+            <a:r>
+              <a:rPr lang="en-US" sz="1400" b="1" baseline="-25000" dirty="0"/>
+              <a:t>K</a:t>
+            </a:r>
+            <a:r>
+              <a:rPr lang="en-US" sz="1400" b="1" dirty="0"/>
+              <a:t> samples</a:t>
+            </a:r>
+            <a:endParaRPr lang="en-US" sz="1400" b="1" baseline="-25000" dirty="0"/>
+          </a:p>
+        </p:txBody>
+      </p:sp>
+      <p:sp>
+        <p:nvSpPr>
+          <p:cNvPr id="14" name="TextBox 13">
+            <a:extLst>
+              <a:ext uri="{FF2B5EF4-FFF2-40B4-BE49-F238E27FC236}">
+                <a16:creationId xmlns:a16="http://schemas.microsoft.com/office/drawing/2014/main" id="{B53871D4-DD54-5947-9416-C9321185B651}"/>
+              </a:ext>
+            </a:extLst>
+          </p:cNvPr>
+          <p:cNvSpPr txBox="1"/>
+          <p:nvPr/>
+        </p:nvSpPr>
+        <p:spPr>
+          <a:xfrm>
+            <a:off x="4220953" y="4429780"/>
+            <a:ext cx="569387" cy="461665"/>
+          </a:xfrm>
+          <a:prstGeom prst="rect">
+            <a:avLst/>
+          </a:prstGeom>
+          <a:noFill/>
+        </p:spPr>
+        <p:txBody>
+          <a:bodyPr wrap="none" rtlCol="0">
+            <a:spAutoFit/>
+          </a:bodyPr>
+          <a:lstStyle/>
+          <a:p>
+            <a:r>
+              <a:rPr lang="en-US" sz="2400" dirty="0"/>
+              <a:t>….</a:t>
+            </a:r>
+            <a:endParaRPr lang="en-US" sz="2400" baseline="-25000" dirty="0"/>
+          </a:p>
+        </p:txBody>
+      </p:sp>
+      <p:sp>
+        <p:nvSpPr>
+          <p:cNvPr id="15" name="TextBox 14">
+            <a:extLst>
+              <a:ext uri="{FF2B5EF4-FFF2-40B4-BE49-F238E27FC236}">
+                <a16:creationId xmlns:a16="http://schemas.microsoft.com/office/drawing/2014/main" id="{07EAD893-23A6-3944-B0C7-F76674F06C28}"/>
+              </a:ext>
+            </a:extLst>
+          </p:cNvPr>
+          <p:cNvSpPr txBox="1"/>
+          <p:nvPr/>
+        </p:nvSpPr>
+        <p:spPr>
+          <a:xfrm>
+            <a:off x="1192696" y="5791200"/>
+            <a:ext cx="4690469" cy="861774"/>
+          </a:xfrm>
+          <a:prstGeom prst="rect">
+            <a:avLst/>
+          </a:prstGeom>
+          <a:solidFill>
+            <a:schemeClr val="accent6">
+              <a:lumMod val="40000"/>
+              <a:lumOff val="60000"/>
+            </a:schemeClr>
+          </a:solidFill>
+        </p:spPr>
+        <p:txBody>
+          <a:bodyPr wrap="square" rtlCol="0">
+            <a:spAutoFit/>
+          </a:bodyPr>
+          <a:lstStyle/>
+          <a:p>
+            <a:pPr algn="ctr"/>
+            <a:r>
+              <a:rPr lang="en-US" b="1" dirty="0">
+                <a:solidFill>
+                  <a:schemeClr val="tx2">
+                    <a:lumMod val="75000"/>
+                  </a:schemeClr>
+                </a:solidFill>
+              </a:rPr>
+              <a:t>Same kind of </a:t>
+            </a:r>
+            <a:r>
+              <a:rPr lang="en-US" b="1" dirty="0" err="1">
+                <a:solidFill>
+                  <a:schemeClr val="tx2">
+                    <a:lumMod val="75000"/>
+                  </a:schemeClr>
+                </a:solidFill>
+              </a:rPr>
+              <a:t>omics</a:t>
+            </a:r>
+            <a:r>
+              <a:rPr lang="en-US" b="1" dirty="0">
+                <a:solidFill>
+                  <a:schemeClr val="tx2">
+                    <a:lumMod val="75000"/>
+                  </a:schemeClr>
+                </a:solidFill>
+              </a:rPr>
+              <a:t> data on K </a:t>
+            </a:r>
+          </a:p>
+          <a:p>
+            <a:pPr algn="ctr"/>
+            <a:r>
+              <a:rPr lang="en-US" b="1" dirty="0">
+                <a:solidFill>
+                  <a:schemeClr val="tx2">
+                    <a:lumMod val="75000"/>
+                  </a:schemeClr>
+                </a:solidFill>
+              </a:rPr>
+              <a:t>different patient cohorts</a:t>
+            </a:r>
+          </a:p>
+          <a:p>
+            <a:r>
+              <a:rPr lang="en-US" sz="1400" b="1" dirty="0">
+                <a:solidFill>
+                  <a:schemeClr val="tx2">
+                    <a:lumMod val="75000"/>
+                  </a:schemeClr>
+                </a:solidFill>
+              </a:rPr>
+              <a:t>     (GWAS, gene expression, methylation, </a:t>
+            </a:r>
+            <a:r>
+              <a:rPr lang="en-US" sz="1400" b="1" dirty="0" err="1">
+                <a:solidFill>
+                  <a:schemeClr val="tx2">
+                    <a:lumMod val="75000"/>
+                  </a:schemeClr>
+                </a:solidFill>
+              </a:rPr>
+              <a:t>eQTL</a:t>
+            </a:r>
+            <a:r>
+              <a:rPr lang="en-US" sz="1400" b="1" dirty="0">
+                <a:solidFill>
+                  <a:schemeClr val="tx2">
+                    <a:lumMod val="75000"/>
+                  </a:schemeClr>
+                </a:solidFill>
+              </a:rPr>
+              <a:t>…)</a:t>
+            </a:r>
+          </a:p>
+        </p:txBody>
+      </p:sp>
+      <p:sp>
+        <p:nvSpPr>
+          <p:cNvPr id="16" name="Rectangle 15">
+            <a:extLst>
+              <a:ext uri="{FF2B5EF4-FFF2-40B4-BE49-F238E27FC236}">
+                <a16:creationId xmlns:a16="http://schemas.microsoft.com/office/drawing/2014/main" id="{82929898-543E-C242-AF19-08C7F9A85AAE}"/>
+              </a:ext>
+            </a:extLst>
+          </p:cNvPr>
+          <p:cNvSpPr/>
+          <p:nvPr/>
+        </p:nvSpPr>
+        <p:spPr>
+          <a:xfrm>
+            <a:off x="8133522" y="4032766"/>
+            <a:ext cx="1251858" cy="452854"/>
+          </a:xfrm>
+          <a:prstGeom prst="rect">
+            <a:avLst/>
+          </a:prstGeom>
+          <a:noFill/>
+        </p:spPr>
+        <p:style>
+          <a:lnRef idx="2">
+            <a:schemeClr val="accent1">
+              <a:shade val="50000"/>
+            </a:schemeClr>
+          </a:lnRef>
+          <a:fillRef idx="1">
+            <a:schemeClr val="accent1"/>
+          </a:fillRef>
+          <a:effectRef idx="0">
+            <a:schemeClr val="accent1"/>
+          </a:effectRef>
+          <a:fontRef idx="minor">
+            <a:schemeClr val="lt1"/>
+          </a:fontRef>
+        </p:style>
+        <p:txBody>
+          <a:bodyPr rtlCol="0" anchor="ctr"/>
+          <a:lstStyle/>
+          <a:p>
+            <a:pPr algn="ctr"/>
+            <a:endParaRPr lang="en-US"/>
+          </a:p>
+        </p:txBody>
+      </p:sp>
+      <p:sp>
+        <p:nvSpPr>
+          <p:cNvPr id="17" name="TextBox 16">
+            <a:extLst>
+              <a:ext uri="{FF2B5EF4-FFF2-40B4-BE49-F238E27FC236}">
+                <a16:creationId xmlns:a16="http://schemas.microsoft.com/office/drawing/2014/main" id="{812F9920-F917-3046-A59E-43B5815D2CB8}"/>
+              </a:ext>
+            </a:extLst>
+          </p:cNvPr>
+          <p:cNvSpPr txBox="1"/>
+          <p:nvPr/>
+        </p:nvSpPr>
+        <p:spPr>
+          <a:xfrm>
+            <a:off x="6747495" y="3962400"/>
+            <a:ext cx="1035861" cy="523220"/>
+          </a:xfrm>
+          <a:prstGeom prst="rect">
+            <a:avLst/>
+          </a:prstGeom>
+          <a:noFill/>
+        </p:spPr>
+        <p:txBody>
+          <a:bodyPr wrap="none" rtlCol="0">
+            <a:spAutoFit/>
+          </a:bodyPr>
+          <a:lstStyle/>
+          <a:p>
+            <a:pPr algn="ctr"/>
+            <a:r>
+              <a:rPr lang="en-US" sz="1400" b="1" dirty="0"/>
+              <a:t>G</a:t>
+            </a:r>
+            <a:r>
+              <a:rPr lang="en-US" sz="1400" b="1" baseline="-25000" dirty="0"/>
+              <a:t>1</a:t>
+            </a:r>
+            <a:r>
+              <a:rPr lang="en-US" sz="1400" b="1" dirty="0"/>
+              <a:t> SNP</a:t>
+            </a:r>
+            <a:r>
+              <a:rPr lang="en-US" sz="1400" b="1" dirty="0">
+                <a:sym typeface="Symbol"/>
+              </a:rPr>
+              <a:t></a:t>
+            </a:r>
+          </a:p>
+          <a:p>
+            <a:pPr algn="ctr"/>
+            <a:r>
+              <a:rPr lang="en-US" sz="1400" b="1" dirty="0"/>
+              <a:t>S samples</a:t>
+            </a:r>
+            <a:endParaRPr lang="en-US" sz="1400" b="1" baseline="-25000" dirty="0"/>
+          </a:p>
+        </p:txBody>
+      </p:sp>
+      <p:sp>
+        <p:nvSpPr>
+          <p:cNvPr id="18" name="Rectangle 17">
+            <a:extLst>
+              <a:ext uri="{FF2B5EF4-FFF2-40B4-BE49-F238E27FC236}">
+                <a16:creationId xmlns:a16="http://schemas.microsoft.com/office/drawing/2014/main" id="{C00B2A9E-9286-8D44-93C7-D0A0A7D5E3B8}"/>
+              </a:ext>
+            </a:extLst>
+          </p:cNvPr>
+          <p:cNvSpPr/>
+          <p:nvPr/>
+        </p:nvSpPr>
+        <p:spPr>
+          <a:xfrm>
+            <a:off x="8133522" y="4566166"/>
+            <a:ext cx="1251858" cy="452854"/>
+          </a:xfrm>
+          <a:prstGeom prst="rect">
+            <a:avLst/>
+          </a:prstGeom>
+          <a:noFill/>
+        </p:spPr>
+        <p:style>
+          <a:lnRef idx="2">
+            <a:schemeClr val="accent1">
+              <a:shade val="50000"/>
+            </a:schemeClr>
+          </a:lnRef>
+          <a:fillRef idx="1">
+            <a:schemeClr val="accent1"/>
+          </a:fillRef>
+          <a:effectRef idx="0">
+            <a:schemeClr val="accent1"/>
+          </a:effectRef>
+          <a:fontRef idx="minor">
+            <a:schemeClr val="lt1"/>
+          </a:fontRef>
+        </p:style>
+        <p:txBody>
+          <a:bodyPr rtlCol="0" anchor="ctr"/>
+          <a:lstStyle/>
+          <a:p>
+            <a:pPr algn="ctr"/>
+            <a:endParaRPr lang="en-US"/>
+          </a:p>
+        </p:txBody>
+      </p:sp>
+      <p:sp>
+        <p:nvSpPr>
+          <p:cNvPr id="19" name="TextBox 18">
+            <a:extLst>
+              <a:ext uri="{FF2B5EF4-FFF2-40B4-BE49-F238E27FC236}">
+                <a16:creationId xmlns:a16="http://schemas.microsoft.com/office/drawing/2014/main" id="{153EE5C7-147C-0145-BEF0-1F601FCD5DFB}"/>
+              </a:ext>
+            </a:extLst>
+          </p:cNvPr>
+          <p:cNvSpPr txBox="1"/>
+          <p:nvPr/>
+        </p:nvSpPr>
+        <p:spPr>
+          <a:xfrm>
+            <a:off x="6274438" y="4495800"/>
+            <a:ext cx="1891865" cy="523220"/>
+          </a:xfrm>
+          <a:prstGeom prst="rect">
+            <a:avLst/>
+          </a:prstGeom>
+          <a:noFill/>
+        </p:spPr>
+        <p:txBody>
+          <a:bodyPr wrap="none" rtlCol="0">
+            <a:spAutoFit/>
+          </a:bodyPr>
+          <a:lstStyle/>
+          <a:p>
+            <a:pPr algn="ctr"/>
+            <a:r>
+              <a:rPr lang="en-US" sz="1400" b="1" dirty="0"/>
+              <a:t>G</a:t>
+            </a:r>
+            <a:r>
+              <a:rPr lang="en-US" sz="1400" b="1" baseline="-25000" dirty="0"/>
+              <a:t>2</a:t>
+            </a:r>
+            <a:r>
+              <a:rPr lang="en-US" sz="1400" b="1" dirty="0"/>
+              <a:t> gene expression </a:t>
+            </a:r>
+            <a:r>
+              <a:rPr lang="en-US" sz="1400" b="1" dirty="0">
+                <a:sym typeface="Symbol"/>
+              </a:rPr>
+              <a:t></a:t>
+            </a:r>
+          </a:p>
+          <a:p>
+            <a:pPr algn="ctr"/>
+            <a:r>
+              <a:rPr lang="en-US" sz="1400" b="1" dirty="0"/>
+              <a:t>S samples</a:t>
+            </a:r>
+            <a:endParaRPr lang="en-US" sz="1400" b="1" baseline="-25000" dirty="0"/>
+          </a:p>
+        </p:txBody>
+      </p:sp>
+      <p:sp>
+        <p:nvSpPr>
+          <p:cNvPr id="20" name="Rectangle 19">
+            <a:extLst>
+              <a:ext uri="{FF2B5EF4-FFF2-40B4-BE49-F238E27FC236}">
+                <a16:creationId xmlns:a16="http://schemas.microsoft.com/office/drawing/2014/main" id="{8D904FFD-A651-C342-8301-9D3CF68D2ADA}"/>
+              </a:ext>
+            </a:extLst>
+          </p:cNvPr>
+          <p:cNvSpPr/>
+          <p:nvPr/>
+        </p:nvSpPr>
+        <p:spPr>
+          <a:xfrm>
+            <a:off x="8177064" y="5317986"/>
+            <a:ext cx="1251858" cy="452854"/>
+          </a:xfrm>
+          <a:prstGeom prst="rect">
+            <a:avLst/>
+          </a:prstGeom>
+          <a:noFill/>
+        </p:spPr>
+        <p:style>
+          <a:lnRef idx="2">
+            <a:schemeClr val="accent1">
+              <a:shade val="50000"/>
+            </a:schemeClr>
+          </a:lnRef>
+          <a:fillRef idx="1">
+            <a:schemeClr val="accent1"/>
+          </a:fillRef>
+          <a:effectRef idx="0">
+            <a:schemeClr val="accent1"/>
+          </a:effectRef>
+          <a:fontRef idx="minor">
+            <a:schemeClr val="lt1"/>
+          </a:fontRef>
+        </p:style>
+        <p:txBody>
+          <a:bodyPr rtlCol="0" anchor="ctr"/>
+          <a:lstStyle/>
+          <a:p>
+            <a:pPr algn="ctr"/>
+            <a:endParaRPr lang="en-US"/>
+          </a:p>
+        </p:txBody>
+      </p:sp>
+      <p:sp>
+        <p:nvSpPr>
+          <p:cNvPr id="21" name="TextBox 20">
+            <a:extLst>
+              <a:ext uri="{FF2B5EF4-FFF2-40B4-BE49-F238E27FC236}">
+                <a16:creationId xmlns:a16="http://schemas.microsoft.com/office/drawing/2014/main" id="{44FDD7D3-A015-A346-8419-9B0CA8B4F503}"/>
+              </a:ext>
+            </a:extLst>
+          </p:cNvPr>
+          <p:cNvSpPr txBox="1"/>
+          <p:nvPr/>
+        </p:nvSpPr>
+        <p:spPr>
+          <a:xfrm>
+            <a:off x="6702071" y="5247620"/>
+            <a:ext cx="1213794" cy="523220"/>
+          </a:xfrm>
+          <a:prstGeom prst="rect">
+            <a:avLst/>
+          </a:prstGeom>
+          <a:noFill/>
+        </p:spPr>
+        <p:txBody>
+          <a:bodyPr wrap="none" rtlCol="0">
+            <a:spAutoFit/>
+          </a:bodyPr>
+          <a:lstStyle/>
+          <a:p>
+            <a:pPr algn="ctr"/>
+            <a:r>
+              <a:rPr lang="en-US" sz="1400" b="1" dirty="0"/>
+              <a:t>G</a:t>
+            </a:r>
+            <a:r>
+              <a:rPr lang="en-US" sz="1400" b="1" baseline="-25000" dirty="0"/>
+              <a:t>H</a:t>
+            </a:r>
+            <a:r>
+              <a:rPr lang="en-US" sz="1400" b="1" dirty="0"/>
+              <a:t> </a:t>
+            </a:r>
+            <a:r>
+              <a:rPr lang="en-US" sz="1400" b="1" dirty="0" err="1"/>
+              <a:t>miRNA</a:t>
+            </a:r>
+            <a:r>
+              <a:rPr lang="en-US" sz="1400" b="1" dirty="0">
+                <a:sym typeface="Symbol"/>
+              </a:rPr>
+              <a:t></a:t>
+            </a:r>
+          </a:p>
+          <a:p>
+            <a:pPr algn="ctr"/>
+            <a:r>
+              <a:rPr lang="en-US" sz="1400" b="1" dirty="0"/>
+              <a:t>S samples</a:t>
+            </a:r>
+            <a:endParaRPr lang="en-US" sz="1400" b="1" baseline="-25000" dirty="0"/>
+          </a:p>
+        </p:txBody>
+      </p:sp>
+      <p:sp>
+        <p:nvSpPr>
+          <p:cNvPr id="22" name="TextBox 21">
+            <a:extLst>
+              <a:ext uri="{FF2B5EF4-FFF2-40B4-BE49-F238E27FC236}">
+                <a16:creationId xmlns:a16="http://schemas.microsoft.com/office/drawing/2014/main" id="{E87D19B0-26E6-A045-9EC8-F8EA338005AA}"/>
+              </a:ext>
+            </a:extLst>
+          </p:cNvPr>
+          <p:cNvSpPr txBox="1"/>
+          <p:nvPr/>
+        </p:nvSpPr>
+        <p:spPr>
+          <a:xfrm>
+            <a:off x="8590722" y="4975007"/>
+            <a:ext cx="492443" cy="348813"/>
+          </a:xfrm>
+          <a:prstGeom prst="rect">
+            <a:avLst/>
+          </a:prstGeom>
+          <a:noFill/>
+        </p:spPr>
+        <p:txBody>
+          <a:bodyPr vert="eaVert" wrap="none" rtlCol="0">
+            <a:spAutoFit/>
+          </a:bodyPr>
+          <a:lstStyle/>
+          <a:p>
+            <a:r>
+              <a:rPr lang="en-US" sz="2000" b="1" dirty="0">
+                <a:sym typeface="Symbol"/>
+              </a:rPr>
+              <a:t></a:t>
+            </a:r>
+            <a:endParaRPr lang="en-US" sz="2000" b="1" dirty="0"/>
+          </a:p>
+        </p:txBody>
+      </p:sp>
+      <p:sp>
+        <p:nvSpPr>
+          <p:cNvPr id="23" name="TextBox 22">
+            <a:extLst>
+              <a:ext uri="{FF2B5EF4-FFF2-40B4-BE49-F238E27FC236}">
+                <a16:creationId xmlns:a16="http://schemas.microsoft.com/office/drawing/2014/main" id="{6EFD1F4E-D9B1-9948-BDD1-DC58003A3CED}"/>
+              </a:ext>
+            </a:extLst>
+          </p:cNvPr>
+          <p:cNvSpPr txBox="1"/>
+          <p:nvPr/>
+        </p:nvSpPr>
+        <p:spPr>
+          <a:xfrm>
+            <a:off x="8514522" y="4038600"/>
+            <a:ext cx="402674" cy="369332"/>
+          </a:xfrm>
+          <a:prstGeom prst="rect">
+            <a:avLst/>
+          </a:prstGeom>
+          <a:noFill/>
+        </p:spPr>
+        <p:txBody>
+          <a:bodyPr wrap="none" rtlCol="0">
+            <a:spAutoFit/>
+          </a:bodyPr>
+          <a:lstStyle/>
+          <a:p>
+            <a:r>
+              <a:rPr lang="en-US" dirty="0"/>
+              <a:t>E</a:t>
+            </a:r>
+            <a:r>
+              <a:rPr lang="en-US" baseline="-25000" dirty="0"/>
+              <a:t>1</a:t>
+            </a:r>
+          </a:p>
+        </p:txBody>
+      </p:sp>
+      <p:sp>
+        <p:nvSpPr>
+          <p:cNvPr id="24" name="TextBox 23">
+            <a:extLst>
+              <a:ext uri="{FF2B5EF4-FFF2-40B4-BE49-F238E27FC236}">
+                <a16:creationId xmlns:a16="http://schemas.microsoft.com/office/drawing/2014/main" id="{7E48B37C-8766-0249-88A1-DD08694A66EF}"/>
+              </a:ext>
+            </a:extLst>
+          </p:cNvPr>
+          <p:cNvSpPr txBox="1"/>
+          <p:nvPr/>
+        </p:nvSpPr>
+        <p:spPr>
+          <a:xfrm>
+            <a:off x="8514522" y="4572000"/>
+            <a:ext cx="402674" cy="369332"/>
+          </a:xfrm>
+          <a:prstGeom prst="rect">
+            <a:avLst/>
+          </a:prstGeom>
+          <a:noFill/>
+        </p:spPr>
+        <p:txBody>
+          <a:bodyPr wrap="none" rtlCol="0">
+            <a:spAutoFit/>
+          </a:bodyPr>
+          <a:lstStyle/>
+          <a:p>
+            <a:r>
+              <a:rPr lang="en-US" dirty="0"/>
+              <a:t>E</a:t>
+            </a:r>
+            <a:r>
+              <a:rPr lang="en-US" baseline="-25000" dirty="0"/>
+              <a:t>2</a:t>
+            </a:r>
+          </a:p>
+        </p:txBody>
+      </p:sp>
+      <p:sp>
+        <p:nvSpPr>
+          <p:cNvPr id="25" name="TextBox 24">
+            <a:extLst>
+              <a:ext uri="{FF2B5EF4-FFF2-40B4-BE49-F238E27FC236}">
+                <a16:creationId xmlns:a16="http://schemas.microsoft.com/office/drawing/2014/main" id="{AAE42C5F-2487-9948-8836-DF486B2E6A13}"/>
+              </a:ext>
+            </a:extLst>
+          </p:cNvPr>
+          <p:cNvSpPr txBox="1"/>
+          <p:nvPr/>
+        </p:nvSpPr>
+        <p:spPr>
+          <a:xfrm>
+            <a:off x="8514522" y="5335488"/>
+            <a:ext cx="453970" cy="369332"/>
+          </a:xfrm>
+          <a:prstGeom prst="rect">
+            <a:avLst/>
+          </a:prstGeom>
+          <a:noFill/>
+        </p:spPr>
+        <p:txBody>
+          <a:bodyPr wrap="none" rtlCol="0">
+            <a:spAutoFit/>
+          </a:bodyPr>
+          <a:lstStyle/>
+          <a:p>
+            <a:r>
+              <a:rPr lang="en-US" dirty="0"/>
+              <a:t>E</a:t>
+            </a:r>
+            <a:r>
+              <a:rPr lang="en-US" baseline="-25000" dirty="0"/>
+              <a:t>H</a:t>
+            </a:r>
+          </a:p>
+        </p:txBody>
+      </p:sp>
+      <p:sp>
+        <p:nvSpPr>
+          <p:cNvPr id="26" name="TextBox 25">
+            <a:extLst>
+              <a:ext uri="{FF2B5EF4-FFF2-40B4-BE49-F238E27FC236}">
+                <a16:creationId xmlns:a16="http://schemas.microsoft.com/office/drawing/2014/main" id="{7B2C1ED7-36C5-4548-A9C0-BF1FB07E92FD}"/>
+              </a:ext>
+            </a:extLst>
+          </p:cNvPr>
+          <p:cNvSpPr txBox="1"/>
+          <p:nvPr/>
+        </p:nvSpPr>
+        <p:spPr>
+          <a:xfrm>
+            <a:off x="6228522" y="5867400"/>
+            <a:ext cx="4191000" cy="646331"/>
+          </a:xfrm>
+          <a:prstGeom prst="rect">
+            <a:avLst/>
+          </a:prstGeom>
+          <a:solidFill>
+            <a:schemeClr val="accent6">
+              <a:lumMod val="40000"/>
+              <a:lumOff val="60000"/>
+            </a:schemeClr>
+          </a:solidFill>
+        </p:spPr>
+        <p:txBody>
+          <a:bodyPr wrap="square" rtlCol="0">
+            <a:spAutoFit/>
+          </a:bodyPr>
+          <a:lstStyle/>
+          <a:p>
+            <a:r>
+              <a:rPr lang="en-US" b="1" dirty="0">
+                <a:solidFill>
+                  <a:schemeClr val="tx2">
+                    <a:lumMod val="75000"/>
+                  </a:schemeClr>
+                </a:solidFill>
+              </a:rPr>
+              <a:t>Same patient cohort analyzed using</a:t>
+            </a:r>
+          </a:p>
+          <a:p>
+            <a:r>
+              <a:rPr lang="en-US" b="1" dirty="0">
+                <a:solidFill>
+                  <a:schemeClr val="tx2">
+                    <a:lumMod val="75000"/>
+                  </a:schemeClr>
+                </a:solidFill>
+              </a:rPr>
+              <a:t>H different </a:t>
+            </a:r>
+            <a:r>
+              <a:rPr lang="en-US" b="1" dirty="0" err="1">
+                <a:solidFill>
+                  <a:schemeClr val="tx2">
+                    <a:lumMod val="75000"/>
+                  </a:schemeClr>
+                </a:solidFill>
+              </a:rPr>
+              <a:t>omics</a:t>
+            </a:r>
+            <a:r>
+              <a:rPr lang="en-US" b="1" dirty="0">
+                <a:solidFill>
+                  <a:schemeClr val="tx2">
+                    <a:lumMod val="75000"/>
+                  </a:schemeClr>
+                </a:solidFill>
+              </a:rPr>
+              <a:t> technology</a:t>
+            </a:r>
+          </a:p>
+        </p:txBody>
+      </p:sp>
+      <p:sp>
+        <p:nvSpPr>
+          <p:cNvPr id="27" name="Rectangle 26">
+            <a:extLst>
+              <a:ext uri="{FF2B5EF4-FFF2-40B4-BE49-F238E27FC236}">
+                <a16:creationId xmlns:a16="http://schemas.microsoft.com/office/drawing/2014/main" id="{1CC5A7F5-8107-F24F-885E-BF10C85100D9}"/>
+              </a:ext>
+            </a:extLst>
+          </p:cNvPr>
+          <p:cNvSpPr/>
+          <p:nvPr/>
+        </p:nvSpPr>
+        <p:spPr>
+          <a:xfrm>
+            <a:off x="6674676" y="6519446"/>
+            <a:ext cx="3821046" cy="338554"/>
+          </a:xfrm>
+          <a:prstGeom prst="rect">
+            <a:avLst/>
+          </a:prstGeom>
+        </p:spPr>
+        <p:txBody>
+          <a:bodyPr wrap="none">
+            <a:spAutoFit/>
+          </a:bodyPr>
+          <a:lstStyle/>
+          <a:p>
+            <a:r>
+              <a:rPr lang="en-US" sz="1600" b="1" i="1" dirty="0">
+                <a:latin typeface="Arial" pitchFamily="34" charset="0"/>
+                <a:cs typeface="Arial" pitchFamily="34" charset="0"/>
+              </a:rPr>
+              <a:t>Tseng et al. 2012, Nucleic Acids Res. </a:t>
+            </a:r>
+          </a:p>
+        </p:txBody>
+      </p:sp>
+      <p:sp>
+        <p:nvSpPr>
+          <p:cNvPr id="29" name="Rectangle 28">
+            <a:extLst>
+              <a:ext uri="{FF2B5EF4-FFF2-40B4-BE49-F238E27FC236}">
+                <a16:creationId xmlns:a16="http://schemas.microsoft.com/office/drawing/2014/main" id="{79657FD7-F0AF-A149-8AA8-0EAFD9E50AD8}"/>
+              </a:ext>
+            </a:extLst>
+          </p:cNvPr>
+          <p:cNvSpPr/>
+          <p:nvPr/>
+        </p:nvSpPr>
+        <p:spPr>
+          <a:xfrm>
+            <a:off x="6111765" y="304800"/>
+            <a:ext cx="4307757" cy="6239708"/>
+          </a:xfrm>
+          <a:prstGeom prst="rect">
+            <a:avLst/>
+          </a:prstGeom>
+          <a:noFill/>
+          <a:ln w="38100">
+            <a:solidFill>
+              <a:srgbClr val="C00000"/>
+            </a:solidFill>
+          </a:ln>
+        </p:spPr>
+        <p:style>
+          <a:lnRef idx="2">
+            <a:schemeClr val="accent1">
+              <a:shade val="50000"/>
+            </a:schemeClr>
+          </a:lnRef>
+          <a:fillRef idx="1">
+            <a:schemeClr val="accent1"/>
+          </a:fillRef>
+          <a:effectRef idx="0">
+            <a:schemeClr val="accent1"/>
+          </a:effectRef>
+          <a:fontRef idx="minor">
+            <a:schemeClr val="lt1"/>
+          </a:fontRef>
+        </p:style>
+        <p:txBody>
+          <a:bodyPr rtlCol="0" anchor="ctr"/>
+          <a:lstStyle/>
+          <a:p>
+            <a:pPr algn="ctr"/>
+            <a:endParaRPr lang="en-US"/>
+          </a:p>
+        </p:txBody>
+      </p:sp>
+    </p:spTree>
+    <p:extLst>
+      <p:ext uri="{BB962C8B-B14F-4D97-AF65-F5344CB8AC3E}">
+        <p14:creationId xmlns:p14="http://schemas.microsoft.com/office/powerpoint/2010/main" val="677482651"/>
+      </p:ext>
+    </p:extLst>
+  </p:cSld>
+  <p:clrMapOvr>
+    <a:masterClrMapping/>
+  </p:clrMapOvr>
+</p:sld>
+</file>
+
 <file path=ppt/theme/theme1.xml><?xml version="1.0" encoding="utf-8"?>
 <a:theme xmlns:a="http://schemas.openxmlformats.org/drawingml/2006/main" name="Office Theme">
   <a:themeElements>

</xml_diff>